<commit_message>
add db diagram to ppt
</commit_message>
<xml_diff>
--- a/Prezentare_Hosszu_Zsolt.pptx
+++ b/Prezentare_Hosszu_Zsolt.pptx
@@ -13,10 +13,11 @@
     <p:sldId id="264" r:id="rId7"/>
     <p:sldId id="263" r:id="rId8"/>
     <p:sldId id="265" r:id="rId9"/>
-    <p:sldId id="266" r:id="rId10"/>
-    <p:sldId id="267" r:id="rId11"/>
-    <p:sldId id="269" r:id="rId12"/>
-    <p:sldId id="268" r:id="rId13"/>
+    <p:sldId id="270" r:id="rId10"/>
+    <p:sldId id="266" r:id="rId11"/>
+    <p:sldId id="267" r:id="rId12"/>
+    <p:sldId id="269" r:id="rId13"/>
+    <p:sldId id="268" r:id="rId14"/>
   </p:sldIdLst>
   <p:sldSz cx="9144000" cy="6858000" type="screen4x3"/>
   <p:notesSz cx="6858000" cy="9144000"/>
@@ -4115,6 +4116,859 @@
         </p:nvSpPr>
         <p:spPr>
           <a:xfrm>
+            <a:off x="457740" y="1101989"/>
+            <a:ext cx="3865610" cy="646331"/>
+          </a:xfrm>
+          <a:prstGeom prst="rect">
+            <a:avLst/>
+          </a:prstGeom>
+          <a:noFill/>
+        </p:spPr>
+        <p:txBody>
+          <a:bodyPr wrap="none" rtlCol="0">
+            <a:spAutoFit/>
+          </a:bodyPr>
+          <a:lstStyle/>
+          <a:p>
+            <a:r>
+              <a:rPr lang="en-US" sz="3600" dirty="0" err="1"/>
+              <a:t>Beneficii</a:t>
+            </a:r>
+            <a:r>
+              <a:rPr lang="en-US" sz="3600" dirty="0"/>
+              <a:t> </a:t>
+            </a:r>
+            <a:r>
+              <a:rPr lang="en-US" sz="3600" dirty="0" err="1"/>
+              <a:t>și</a:t>
+            </a:r>
+            <a:r>
+              <a:rPr lang="en-US" sz="3600" dirty="0"/>
+              <a:t> </a:t>
+            </a:r>
+            <a:r>
+              <a:rPr lang="ro-RO" sz="3600" dirty="0"/>
+              <a:t>a</a:t>
+            </a:r>
+            <a:r>
+              <a:rPr lang="en-US" sz="3600" dirty="0" err="1"/>
+              <a:t>vantaje</a:t>
+            </a:r>
+            <a:endParaRPr lang="en-US" sz="3600" dirty="0">
+              <a:latin typeface="UT Sans"/>
+            </a:endParaRPr>
+          </a:p>
+        </p:txBody>
+      </p:sp>
+      <p:sp>
+        <p:nvSpPr>
+          <p:cNvPr id="3" name="TextBox 2">
+            <a:extLst>
+              <a:ext uri="{FF2B5EF4-FFF2-40B4-BE49-F238E27FC236}">
+                <a16:creationId xmlns:a16="http://schemas.microsoft.com/office/drawing/2014/main" id="{F7A177C1-1D4C-0D32-F44E-0C84D4FF1036}"/>
+              </a:ext>
+            </a:extLst>
+          </p:cNvPr>
+          <p:cNvSpPr txBox="1"/>
+          <p:nvPr/>
+        </p:nvSpPr>
+        <p:spPr>
+          <a:xfrm>
+            <a:off x="457740" y="1988840"/>
+            <a:ext cx="8064872" cy="5078313"/>
+          </a:xfrm>
+          <a:prstGeom prst="rect">
+            <a:avLst/>
+          </a:prstGeom>
+          <a:noFill/>
+        </p:spPr>
+        <p:txBody>
+          <a:bodyPr wrap="square" rtlCol="0">
+            <a:spAutoFit/>
+          </a:bodyPr>
+          <a:lstStyle/>
+          <a:p>
+            <a:pPr marL="342900" indent="-342900" algn="just">
+              <a:buBlip>
+                <a:blip r:embed="rId3"/>
+              </a:buBlip>
+            </a:pPr>
+            <a:r>
+              <a:rPr lang="en-US" dirty="0" err="1"/>
+              <a:t>Performanță</a:t>
+            </a:r>
+            <a:r>
+              <a:rPr lang="en-US" dirty="0"/>
+              <a:t> </a:t>
+            </a:r>
+            <a:r>
+              <a:rPr lang="en-US" dirty="0" err="1"/>
+              <a:t>superioară</a:t>
+            </a:r>
+            <a:r>
+              <a:rPr lang="en-US" dirty="0"/>
+              <a:t>: </a:t>
+            </a:r>
+            <a:r>
+              <a:rPr lang="en-US" dirty="0" err="1"/>
+              <a:t>Spre</a:t>
+            </a:r>
+            <a:r>
+              <a:rPr lang="en-US" dirty="0"/>
+              <a:t> </a:t>
+            </a:r>
+            <a:r>
+              <a:rPr lang="en-US" dirty="0" err="1"/>
+              <a:t>deosebire</a:t>
+            </a:r>
+            <a:r>
+              <a:rPr lang="en-US" dirty="0"/>
+              <a:t> de </a:t>
+            </a:r>
+            <a:r>
+              <a:rPr lang="en-US" dirty="0" err="1"/>
+              <a:t>alte</a:t>
+            </a:r>
+            <a:r>
+              <a:rPr lang="en-US" dirty="0"/>
+              <a:t> </a:t>
+            </a:r>
+            <a:r>
+              <a:rPr lang="en-US" dirty="0" err="1"/>
+              <a:t>aplicații</a:t>
+            </a:r>
+            <a:r>
+              <a:rPr lang="en-US" dirty="0"/>
+              <a:t> care </a:t>
+            </a:r>
+            <a:r>
+              <a:rPr lang="en-US" dirty="0" err="1"/>
+              <a:t>generează</a:t>
+            </a:r>
+            <a:r>
+              <a:rPr lang="en-US" dirty="0"/>
+              <a:t> </a:t>
+            </a:r>
+            <a:r>
+              <a:rPr lang="en-US" dirty="0" err="1"/>
+              <a:t>documente</a:t>
+            </a:r>
+            <a:r>
+              <a:rPr lang="en-US" dirty="0"/>
+              <a:t> </a:t>
+            </a:r>
+            <a:r>
+              <a:rPr lang="en-US" dirty="0" err="1"/>
+              <a:t>în</a:t>
+            </a:r>
+            <a:r>
+              <a:rPr lang="en-US" dirty="0"/>
+              <a:t> HTML </a:t>
+            </a:r>
+            <a:r>
+              <a:rPr lang="en-US" dirty="0" err="1"/>
+              <a:t>și</a:t>
+            </a:r>
+            <a:r>
+              <a:rPr lang="en-US" dirty="0"/>
+              <a:t> </a:t>
+            </a:r>
+            <a:r>
+              <a:rPr lang="en-US" dirty="0" err="1"/>
+              <a:t>apoi</a:t>
+            </a:r>
+            <a:r>
+              <a:rPr lang="en-US" dirty="0"/>
+              <a:t> le </a:t>
+            </a:r>
+            <a:r>
+              <a:rPr lang="en-US" dirty="0" err="1"/>
+              <a:t>convertesc</a:t>
+            </a:r>
+            <a:r>
+              <a:rPr lang="en-US" dirty="0"/>
+              <a:t> </a:t>
+            </a:r>
+            <a:r>
+              <a:rPr lang="en-US" dirty="0" err="1"/>
+              <a:t>în</a:t>
+            </a:r>
+            <a:r>
+              <a:rPr lang="en-US" dirty="0"/>
+              <a:t> PDF, </a:t>
+            </a:r>
+            <a:r>
+              <a:rPr lang="en-US" dirty="0" err="1"/>
+              <a:t>InvoiceJet</a:t>
+            </a:r>
+            <a:r>
+              <a:rPr lang="en-US" dirty="0"/>
+              <a:t> </a:t>
+            </a:r>
+            <a:r>
+              <a:rPr lang="en-US" dirty="0" err="1"/>
+              <a:t>convertește</a:t>
+            </a:r>
+            <a:r>
+              <a:rPr lang="en-US" dirty="0"/>
+              <a:t> direct </a:t>
+            </a:r>
+            <a:r>
+              <a:rPr lang="en-US" dirty="0" err="1"/>
+              <a:t>în</a:t>
+            </a:r>
+            <a:r>
+              <a:rPr lang="en-US" dirty="0"/>
+              <a:t> PDF </a:t>
+            </a:r>
+            <a:r>
+              <a:rPr lang="en-US" dirty="0" err="1"/>
+              <a:t>și</a:t>
+            </a:r>
+            <a:r>
+              <a:rPr lang="en-US" dirty="0"/>
+              <a:t> face embed cu </a:t>
+            </a:r>
+            <a:r>
+              <a:rPr lang="en-US" dirty="0" err="1"/>
+              <a:t>iframe</a:t>
+            </a:r>
+            <a:r>
+              <a:rPr lang="en-US" dirty="0"/>
+              <a:t>, </a:t>
+            </a:r>
+            <a:r>
+              <a:rPr lang="en-US" dirty="0" err="1"/>
+              <a:t>oferind</a:t>
+            </a:r>
+            <a:r>
+              <a:rPr lang="en-US" dirty="0"/>
+              <a:t> </a:t>
+            </a:r>
+            <a:r>
+              <a:rPr lang="en-US" dirty="0" err="1"/>
+              <a:t>oferind</a:t>
+            </a:r>
+            <a:r>
+              <a:rPr lang="en-US" dirty="0"/>
+              <a:t> o </a:t>
+            </a:r>
+            <a:r>
+              <a:rPr lang="en-US" dirty="0" err="1"/>
+              <a:t>performanță</a:t>
+            </a:r>
+            <a:r>
+              <a:rPr lang="en-US" dirty="0"/>
+              <a:t> </a:t>
+            </a:r>
+            <a:r>
+              <a:rPr lang="en-US" dirty="0" err="1"/>
+              <a:t>mai</a:t>
+            </a:r>
+            <a:r>
+              <a:rPr lang="en-US" dirty="0"/>
+              <a:t> </a:t>
+            </a:r>
+            <a:r>
+              <a:rPr lang="en-US" dirty="0" err="1"/>
+              <a:t>bună</a:t>
+            </a:r>
+            <a:r>
+              <a:rPr lang="ro-RO" dirty="0"/>
+              <a:t> și un timp de previzualizare mai rapid.</a:t>
+            </a:r>
+          </a:p>
+          <a:p>
+            <a:pPr algn="just"/>
+            <a:endParaRPr lang="ro-RO" dirty="0"/>
+          </a:p>
+          <a:p>
+            <a:pPr marL="342900" indent="-342900" algn="just">
+              <a:buBlip>
+                <a:blip r:embed="rId3"/>
+              </a:buBlip>
+            </a:pPr>
+            <a:r>
+              <a:rPr lang="en-US" dirty="0" err="1">
+                <a:latin typeface="UT Sans"/>
+              </a:rPr>
+              <a:t>Editare</a:t>
+            </a:r>
+            <a:r>
+              <a:rPr lang="ro-RO" dirty="0">
+                <a:latin typeface="UT Sans"/>
+              </a:rPr>
+              <a:t>/previzualizare</a:t>
+            </a:r>
+            <a:r>
+              <a:rPr lang="en-US" dirty="0">
+                <a:latin typeface="UT Sans"/>
+              </a:rPr>
+              <a:t> </a:t>
+            </a:r>
+            <a:r>
+              <a:rPr lang="en-US" dirty="0" err="1">
+                <a:latin typeface="UT Sans"/>
+              </a:rPr>
+              <a:t>facturi</a:t>
+            </a:r>
+            <a:r>
+              <a:rPr lang="en-US" dirty="0">
+                <a:latin typeface="UT Sans"/>
+              </a:rPr>
+              <a:t> </a:t>
+            </a:r>
+            <a:r>
+              <a:rPr lang="en-US" dirty="0" err="1">
+                <a:latin typeface="UT Sans"/>
+              </a:rPr>
+              <a:t>emise</a:t>
+            </a:r>
+            <a:r>
+              <a:rPr lang="en-US" dirty="0">
+                <a:latin typeface="UT Sans"/>
+              </a:rPr>
+              <a:t>: </a:t>
+            </a:r>
+            <a:r>
+              <a:rPr lang="en-US" dirty="0" err="1">
+                <a:latin typeface="UT Sans"/>
+              </a:rPr>
+              <a:t>Oferă</a:t>
+            </a:r>
+            <a:r>
+              <a:rPr lang="en-US" dirty="0">
+                <a:latin typeface="UT Sans"/>
+              </a:rPr>
+              <a:t> </a:t>
+            </a:r>
+            <a:r>
+              <a:rPr lang="en-US" dirty="0" err="1">
+                <a:latin typeface="UT Sans"/>
+              </a:rPr>
+              <a:t>posibilitatea</a:t>
+            </a:r>
+            <a:r>
+              <a:rPr lang="en-US" dirty="0">
+                <a:latin typeface="UT Sans"/>
+              </a:rPr>
+              <a:t> de a </a:t>
+            </a:r>
+            <a:r>
+              <a:rPr lang="en-US" dirty="0" err="1">
+                <a:latin typeface="UT Sans"/>
+              </a:rPr>
+              <a:t>edita</a:t>
+            </a:r>
+            <a:r>
+              <a:rPr lang="en-US" dirty="0">
+                <a:latin typeface="UT Sans"/>
+              </a:rPr>
+              <a:t> </a:t>
+            </a:r>
+            <a:r>
+              <a:rPr lang="en-US" dirty="0" err="1">
+                <a:latin typeface="UT Sans"/>
+              </a:rPr>
+              <a:t>facturile</a:t>
+            </a:r>
+            <a:r>
+              <a:rPr lang="en-US" dirty="0">
+                <a:latin typeface="UT Sans"/>
+              </a:rPr>
+              <a:t> </a:t>
+            </a:r>
+            <a:r>
+              <a:rPr lang="en-US" dirty="0" err="1">
+                <a:latin typeface="UT Sans"/>
+              </a:rPr>
+              <a:t>chiar</a:t>
+            </a:r>
+            <a:r>
+              <a:rPr lang="en-US" dirty="0">
+                <a:latin typeface="UT Sans"/>
+              </a:rPr>
+              <a:t> </a:t>
+            </a:r>
+            <a:r>
+              <a:rPr lang="en-US" dirty="0" err="1">
+                <a:latin typeface="UT Sans"/>
+              </a:rPr>
+              <a:t>și</a:t>
+            </a:r>
+            <a:r>
+              <a:rPr lang="en-US" dirty="0">
+                <a:latin typeface="UT Sans"/>
+              </a:rPr>
+              <a:t> </a:t>
+            </a:r>
+            <a:r>
+              <a:rPr lang="en-US" dirty="0" err="1">
+                <a:latin typeface="UT Sans"/>
+              </a:rPr>
+              <a:t>după</a:t>
+            </a:r>
+            <a:r>
+              <a:rPr lang="en-US" dirty="0">
+                <a:latin typeface="UT Sans"/>
+              </a:rPr>
+              <a:t> </a:t>
+            </a:r>
+            <a:r>
+              <a:rPr lang="en-US" dirty="0" err="1">
+                <a:latin typeface="UT Sans"/>
+              </a:rPr>
+              <a:t>ce</a:t>
+            </a:r>
+            <a:r>
+              <a:rPr lang="en-US" dirty="0">
+                <a:latin typeface="UT Sans"/>
+              </a:rPr>
+              <a:t> au </a:t>
+            </a:r>
+            <a:r>
+              <a:rPr lang="en-US" dirty="0" err="1">
+                <a:latin typeface="UT Sans"/>
+              </a:rPr>
+              <a:t>fost</a:t>
+            </a:r>
+            <a:r>
+              <a:rPr lang="en-US" dirty="0">
+                <a:latin typeface="UT Sans"/>
+              </a:rPr>
+              <a:t> </a:t>
+            </a:r>
+            <a:r>
+              <a:rPr lang="en-US" dirty="0" err="1">
+                <a:latin typeface="UT Sans"/>
+              </a:rPr>
+              <a:t>emise</a:t>
+            </a:r>
+            <a:r>
+              <a:rPr lang="en-US" dirty="0">
+                <a:latin typeface="UT Sans"/>
+              </a:rPr>
+              <a:t>.</a:t>
+            </a:r>
+            <a:r>
+              <a:rPr lang="ro-RO" dirty="0">
+                <a:latin typeface="UT Sans"/>
+              </a:rPr>
+              <a:t> Oferă posibilitatea de previzualizare a facturii, înainte ca aceasta să fie actualizată.</a:t>
+            </a:r>
+          </a:p>
+          <a:p>
+            <a:pPr algn="just"/>
+            <a:endParaRPr lang="ro-RO" dirty="0">
+              <a:latin typeface="UT Sans"/>
+            </a:endParaRPr>
+          </a:p>
+          <a:p>
+            <a:pPr marL="342900" indent="-342900" algn="just">
+              <a:buBlip>
+                <a:blip r:embed="rId3"/>
+              </a:buBlip>
+            </a:pPr>
+            <a:r>
+              <a:rPr lang="en-US" dirty="0" err="1"/>
+              <a:t>Aplicație</a:t>
+            </a:r>
+            <a:r>
+              <a:rPr lang="en-US" dirty="0"/>
+              <a:t> Single Page (SPA): </a:t>
+            </a:r>
+            <a:r>
+              <a:rPr lang="en-US" dirty="0" err="1"/>
+              <a:t>InvoiceJet</a:t>
+            </a:r>
+            <a:r>
+              <a:rPr lang="en-US" dirty="0"/>
+              <a:t> </a:t>
+            </a:r>
+            <a:r>
+              <a:rPr lang="en-US" dirty="0" err="1"/>
+              <a:t>este</a:t>
+            </a:r>
+            <a:r>
+              <a:rPr lang="en-US" dirty="0"/>
+              <a:t> o </a:t>
+            </a:r>
+            <a:r>
+              <a:rPr lang="en-US" dirty="0" err="1"/>
+              <a:t>aplicație</a:t>
+            </a:r>
+            <a:r>
+              <a:rPr lang="en-US" dirty="0"/>
+              <a:t> de tip SPA, </a:t>
+            </a:r>
+            <a:r>
+              <a:rPr lang="en-US" dirty="0" err="1"/>
+              <a:t>spre</a:t>
+            </a:r>
+            <a:r>
+              <a:rPr lang="en-US" dirty="0"/>
+              <a:t> </a:t>
+            </a:r>
+            <a:r>
+              <a:rPr lang="en-US" dirty="0" err="1"/>
+              <a:t>deosebire</a:t>
+            </a:r>
+            <a:r>
+              <a:rPr lang="en-US" dirty="0"/>
+              <a:t> de </a:t>
+            </a:r>
+            <a:r>
+              <a:rPr lang="en-US" dirty="0" err="1"/>
+              <a:t>multe</a:t>
+            </a:r>
+            <a:r>
+              <a:rPr lang="en-US" dirty="0"/>
+              <a:t> </a:t>
+            </a:r>
+            <a:r>
+              <a:rPr lang="en-US" dirty="0" err="1"/>
+              <a:t>alte</a:t>
+            </a:r>
+            <a:r>
+              <a:rPr lang="en-US" dirty="0"/>
+              <a:t> </a:t>
+            </a:r>
+            <a:r>
+              <a:rPr lang="en-US" dirty="0" err="1"/>
+              <a:t>aplicații</a:t>
+            </a:r>
+            <a:r>
+              <a:rPr lang="en-US" dirty="0"/>
+              <a:t> de pe </a:t>
+            </a:r>
+            <a:r>
+              <a:rPr lang="en-US" dirty="0" err="1"/>
+              <a:t>piață</a:t>
+            </a:r>
+            <a:r>
+              <a:rPr lang="en-US" dirty="0"/>
+              <a:t>, </a:t>
+            </a:r>
+            <a:r>
+              <a:rPr lang="en-US" dirty="0" err="1"/>
+              <a:t>asigurând</a:t>
+            </a:r>
+            <a:r>
+              <a:rPr lang="en-US" dirty="0"/>
+              <a:t> o </a:t>
+            </a:r>
+            <a:r>
+              <a:rPr lang="en-US" dirty="0" err="1"/>
+              <a:t>experiență</a:t>
+            </a:r>
+            <a:r>
+              <a:rPr lang="en-US" dirty="0"/>
+              <a:t> de </a:t>
+            </a:r>
+            <a:r>
+              <a:rPr lang="en-US" dirty="0" err="1"/>
+              <a:t>utilizare</a:t>
+            </a:r>
+            <a:r>
+              <a:rPr lang="en-US" dirty="0"/>
+              <a:t> </a:t>
+            </a:r>
+            <a:r>
+              <a:rPr lang="en-US" dirty="0" err="1"/>
+              <a:t>fluidă</a:t>
+            </a:r>
+            <a:r>
+              <a:rPr lang="en-US" dirty="0"/>
+              <a:t> </a:t>
+            </a:r>
+            <a:r>
+              <a:rPr lang="en-US" dirty="0" err="1"/>
+              <a:t>și</a:t>
+            </a:r>
+            <a:r>
+              <a:rPr lang="en-US" dirty="0"/>
+              <a:t> </a:t>
+            </a:r>
+            <a:r>
+              <a:rPr lang="en-US" dirty="0" err="1"/>
+              <a:t>rapidă</a:t>
+            </a:r>
+            <a:r>
+              <a:rPr lang="ro-RO" dirty="0"/>
+              <a:t>, fără reîncarcare paginii la schimbarea rutei.</a:t>
+            </a:r>
+          </a:p>
+          <a:p>
+            <a:pPr algn="just"/>
+            <a:endParaRPr lang="ro-RO" dirty="0">
+              <a:latin typeface="UT Sans"/>
+            </a:endParaRPr>
+          </a:p>
+          <a:p>
+            <a:pPr marL="342900" indent="-342900" algn="just">
+              <a:buBlip>
+                <a:blip r:embed="rId3"/>
+              </a:buBlip>
+            </a:pPr>
+            <a:r>
+              <a:rPr lang="ro-RO" dirty="0">
+                <a:latin typeface="UT Sans"/>
+              </a:rPr>
+              <a:t>Acuratețea datelor financiare</a:t>
+            </a:r>
+            <a:r>
+              <a:rPr lang="en-US" dirty="0">
+                <a:latin typeface="UT Sans"/>
+              </a:rPr>
+              <a:t>: </a:t>
+            </a:r>
+            <a:r>
+              <a:rPr lang="ro-RO" dirty="0">
+                <a:latin typeface="UT Sans"/>
+              </a:rPr>
+              <a:t>Datele formelor juridice pot fi populate cu ajutorul API-ului oferit de ANAF, care conține date specifice necesare pentru completarea datelor furnizorilor, cât și a clienților specificând doar câmpul CUI.</a:t>
+            </a:r>
+            <a:r>
+              <a:rPr lang="en-US" dirty="0">
+                <a:latin typeface="UT Sans"/>
+              </a:rPr>
+              <a:t>	</a:t>
+            </a:r>
+            <a:endParaRPr lang="ro-RO" dirty="0">
+              <a:latin typeface="UT Sans"/>
+            </a:endParaRPr>
+          </a:p>
+          <a:p>
+            <a:pPr algn="just"/>
+            <a:r>
+              <a:rPr lang="ro-RO" dirty="0">
+                <a:latin typeface="UT Sans"/>
+              </a:rPr>
+              <a:t>	</a:t>
+            </a:r>
+            <a:endParaRPr lang="en-US" dirty="0">
+              <a:latin typeface="UT Sans"/>
+            </a:endParaRPr>
+          </a:p>
+          <a:p>
+            <a:pPr algn="just"/>
+            <a:r>
+              <a:rPr lang="en-US" dirty="0">
+                <a:latin typeface="UT Sans"/>
+              </a:rPr>
+              <a:t>       </a:t>
+            </a:r>
+            <a:endParaRPr lang="ro-RO" dirty="0">
+              <a:latin typeface="UT Sans"/>
+            </a:endParaRPr>
+          </a:p>
+        </p:txBody>
+      </p:sp>
+    </p:spTree>
+    <p:extLst>
+      <p:ext uri="{BB962C8B-B14F-4D97-AF65-F5344CB8AC3E}">
+        <p14:creationId xmlns:p14="http://schemas.microsoft.com/office/powerpoint/2010/main" val="79503179"/>
+      </p:ext>
+    </p:extLst>
+  </p:cSld>
+  <p:clrMapOvr>
+    <a:masterClrMapping/>
+  </p:clrMapOvr>
+</p:sld>
+</file>
+
+<file path=ppt/slides/slide11.xml><?xml version="1.0" encoding="utf-8"?>
+<p:sld xmlns:a="http://schemas.openxmlformats.org/drawingml/2006/main" xmlns:r="http://schemas.openxmlformats.org/officeDocument/2006/relationships" xmlns:p="http://schemas.openxmlformats.org/presentationml/2006/main">
+  <p:cSld>
+    <p:spTree>
+      <p:nvGrpSpPr>
+        <p:cNvPr id="1" name=""/>
+        <p:cNvGrpSpPr/>
+        <p:nvPr/>
+      </p:nvGrpSpPr>
+      <p:grpSpPr>
+        <a:xfrm>
+          <a:off x="0" y="0"/>
+          <a:ext cx="0" cy="0"/>
+          <a:chOff x="0" y="0"/>
+          <a:chExt cx="0" cy="0"/>
+        </a:xfrm>
+      </p:grpSpPr>
+      <p:grpSp>
+        <p:nvGrpSpPr>
+          <p:cNvPr id="4" name="Group 3"/>
+          <p:cNvGrpSpPr/>
+          <p:nvPr/>
+        </p:nvGrpSpPr>
+        <p:grpSpPr>
+          <a:xfrm>
+            <a:off x="8460432" y="6237312"/>
+            <a:ext cx="216000" cy="216000"/>
+            <a:chOff x="2772000" y="1932221"/>
+            <a:chExt cx="2340000" cy="2340000"/>
+          </a:xfrm>
+        </p:grpSpPr>
+        <p:sp>
+          <p:nvSpPr>
+            <p:cNvPr id="5" name="Rectangle 4"/>
+            <p:cNvSpPr/>
+            <p:nvPr/>
+          </p:nvSpPr>
+          <p:spPr>
+            <a:xfrm>
+              <a:off x="2772000" y="1932221"/>
+              <a:ext cx="2340000" cy="2340000"/>
+            </a:xfrm>
+            <a:prstGeom prst="rect">
+              <a:avLst/>
+            </a:prstGeom>
+            <a:solidFill>
+              <a:schemeClr val="bg1">
+                <a:lumMod val="75000"/>
+              </a:schemeClr>
+            </a:solidFill>
+            <a:ln>
+              <a:noFill/>
+            </a:ln>
+          </p:spPr>
+          <p:style>
+            <a:lnRef idx="2">
+              <a:schemeClr val="accent1">
+                <a:shade val="50000"/>
+              </a:schemeClr>
+            </a:lnRef>
+            <a:fillRef idx="1">
+              <a:schemeClr val="accent1"/>
+            </a:fillRef>
+            <a:effectRef idx="0">
+              <a:schemeClr val="accent1"/>
+            </a:effectRef>
+            <a:fontRef idx="minor">
+              <a:schemeClr val="lt1"/>
+            </a:fontRef>
+          </p:style>
+          <p:txBody>
+            <a:bodyPr rtlCol="0" anchor="ctr"/>
+            <a:lstStyle/>
+            <a:p>
+              <a:pPr algn="ctr"/>
+              <a:endParaRPr lang="en-US">
+                <a:ln>
+                  <a:solidFill>
+                    <a:schemeClr val="bg2">
+                      <a:lumMod val="75000"/>
+                    </a:schemeClr>
+                  </a:solidFill>
+                </a:ln>
+                <a:solidFill>
+                  <a:schemeClr val="tx1"/>
+                </a:solidFill>
+              </a:endParaRPr>
+            </a:p>
+          </p:txBody>
+        </p:sp>
+        <p:sp>
+          <p:nvSpPr>
+            <p:cNvPr id="6" name="Rectangle 5"/>
+            <p:cNvSpPr/>
+            <p:nvPr/>
+          </p:nvSpPr>
+          <p:spPr>
+            <a:xfrm>
+              <a:off x="3546000" y="2706221"/>
+              <a:ext cx="792000" cy="792000"/>
+            </a:xfrm>
+            <a:prstGeom prst="rect">
+              <a:avLst/>
+            </a:prstGeom>
+            <a:solidFill>
+              <a:schemeClr val="bg1"/>
+            </a:solidFill>
+            <a:ln>
+              <a:noFill/>
+            </a:ln>
+          </p:spPr>
+          <p:style>
+            <a:lnRef idx="2">
+              <a:schemeClr val="accent1">
+                <a:shade val="50000"/>
+              </a:schemeClr>
+            </a:lnRef>
+            <a:fillRef idx="1">
+              <a:schemeClr val="accent1"/>
+            </a:fillRef>
+            <a:effectRef idx="0">
+              <a:schemeClr val="accent1"/>
+            </a:effectRef>
+            <a:fontRef idx="minor">
+              <a:schemeClr val="lt1"/>
+            </a:fontRef>
+          </p:style>
+          <p:txBody>
+            <a:bodyPr rtlCol="0" anchor="ctr"/>
+            <a:lstStyle/>
+            <a:p>
+              <a:pPr algn="ctr"/>
+              <a:endParaRPr lang="en-US">
+                <a:ln>
+                  <a:solidFill>
+                    <a:schemeClr val="bg2">
+                      <a:lumMod val="75000"/>
+                    </a:schemeClr>
+                  </a:solidFill>
+                </a:ln>
+                <a:solidFill>
+                  <a:schemeClr val="tx1"/>
+                </a:solidFill>
+              </a:endParaRPr>
+            </a:p>
+          </p:txBody>
+        </p:sp>
+      </p:grpSp>
+      <p:pic>
+        <p:nvPicPr>
+          <p:cNvPr id="2" name="Picture 1"/>
+          <p:cNvPicPr>
+            <a:picLocks noChangeAspect="1"/>
+          </p:cNvPicPr>
+          <p:nvPr/>
+        </p:nvPicPr>
+        <p:blipFill>
+          <a:blip r:embed="rId2" cstate="print">
+            <a:extLst>
+              <a:ext uri="{28A0092B-C50C-407E-A947-70E740481C1C}">
+                <a14:useLocalDpi xmlns:a14="http://schemas.microsoft.com/office/drawing/2010/main" val="0"/>
+              </a:ext>
+            </a:extLst>
+          </a:blip>
+          <a:stretch>
+            <a:fillRect/>
+          </a:stretch>
+        </p:blipFill>
+        <p:spPr>
+          <a:xfrm>
+            <a:off x="287524" y="260648"/>
+            <a:ext cx="1692188" cy="600822"/>
+          </a:xfrm>
+          <a:prstGeom prst="rect">
+            <a:avLst/>
+          </a:prstGeom>
+        </p:spPr>
+      </p:pic>
+      <p:sp>
+        <p:nvSpPr>
+          <p:cNvPr id="13" name="TextBox 12">
+            <a:extLst>
+              <a:ext uri="{FF2B5EF4-FFF2-40B4-BE49-F238E27FC236}">
+                <a16:creationId xmlns:a16="http://schemas.microsoft.com/office/drawing/2014/main" id="{649ECE41-5C33-D26B-835E-7DB29D4E17B8}"/>
+              </a:ext>
+            </a:extLst>
+          </p:cNvPr>
+          <p:cNvSpPr txBox="1"/>
+          <p:nvPr/>
+        </p:nvSpPr>
+        <p:spPr>
+          <a:xfrm>
             <a:off x="3167844" y="2924944"/>
             <a:ext cx="2986587" cy="646331"/>
           </a:xfrm>
@@ -4154,7 +5008,7 @@
 </p:sld>
 </file>
 
-<file path=ppt/slides/slide11.xml><?xml version="1.0" encoding="utf-8"?>
+<file path=ppt/slides/slide12.xml><?xml version="1.0" encoding="utf-8"?>
 <p:sld xmlns:a="http://schemas.openxmlformats.org/drawingml/2006/main" xmlns:r="http://schemas.openxmlformats.org/officeDocument/2006/relationships" xmlns:p="http://schemas.openxmlformats.org/presentationml/2006/main">
   <p:cSld>
     <p:spTree>
@@ -4385,7 +5239,7 @@
 </p:sld>
 </file>
 
-<file path=ppt/slides/slide12.xml><?xml version="1.0" encoding="utf-8"?>
+<file path=ppt/slides/slide13.xml><?xml version="1.0" encoding="utf-8"?>
 <p:sld xmlns:a="http://schemas.openxmlformats.org/drawingml/2006/main" xmlns:r="http://schemas.openxmlformats.org/officeDocument/2006/relationships" xmlns:p="http://schemas.openxmlformats.org/presentationml/2006/main">
   <p:cSld>
     <p:spTree>
@@ -8400,7 +9254,7 @@
         <p:spPr>
           <a:xfrm>
             <a:off x="457740" y="1101989"/>
-            <a:ext cx="3865610" cy="646331"/>
+            <a:ext cx="4567019" cy="646331"/>
           </a:xfrm>
           <a:prstGeom prst="rect">
             <a:avLst/>
@@ -8414,28 +9268,10 @@
           <a:lstStyle/>
           <a:p>
             <a:r>
-              <a:rPr lang="en-US" sz="3600" dirty="0" err="1"/>
-              <a:t>Beneficii</a:t>
-            </a:r>
-            <a:r>
-              <a:rPr lang="en-US" sz="3600" dirty="0"/>
-              <a:t> </a:t>
-            </a:r>
-            <a:r>
-              <a:rPr lang="en-US" sz="3600" dirty="0" err="1"/>
-              <a:t>și</a:t>
-            </a:r>
-            <a:r>
-              <a:rPr lang="en-US" sz="3600" dirty="0"/>
-              <a:t> </a:t>
-            </a:r>
-            <a:r>
-              <a:rPr lang="ro-RO" sz="3600" dirty="0"/>
-              <a:t>a</a:t>
-            </a:r>
-            <a:r>
-              <a:rPr lang="en-US" sz="3600" dirty="0" err="1"/>
-              <a:t>vantaje</a:t>
+              <a:rPr lang="ro-RO" sz="3600" dirty="0">
+                <a:latin typeface="UT Sans"/>
+              </a:rPr>
+              <a:t>Diagrama bazei de date</a:t>
             </a:r>
             <a:endParaRPr lang="en-US" sz="3600" dirty="0">
               <a:latin typeface="UT Sans"/>
@@ -8443,614 +9279,40 @@
           </a:p>
         </p:txBody>
       </p:sp>
-      <p:sp>
-        <p:nvSpPr>
-          <p:cNvPr id="3" name="TextBox 2">
+      <p:pic>
+        <p:nvPicPr>
+          <p:cNvPr id="3" name="Picture 2" descr="A computer screen shot of a computer&#10;&#10;Description automatically generated">
             <a:extLst>
               <a:ext uri="{FF2B5EF4-FFF2-40B4-BE49-F238E27FC236}">
-                <a16:creationId xmlns:a16="http://schemas.microsoft.com/office/drawing/2014/main" id="{F7A177C1-1D4C-0D32-F44E-0C84D4FF1036}"/>
+                <a16:creationId xmlns:a16="http://schemas.microsoft.com/office/drawing/2014/main" id="{402D0E33-B754-3F4A-1C48-032409928F58}"/>
               </a:ext>
             </a:extLst>
           </p:cNvPr>
-          <p:cNvSpPr txBox="1"/>
+          <p:cNvPicPr>
+            <a:picLocks noChangeAspect="1"/>
+          </p:cNvPicPr>
           <p:nvPr/>
-        </p:nvSpPr>
+        </p:nvPicPr>
+        <p:blipFill>
+          <a:blip r:embed="rId3"/>
+          <a:stretch>
+            <a:fillRect/>
+          </a:stretch>
+        </p:blipFill>
         <p:spPr>
           <a:xfrm>
-            <a:off x="457740" y="1988840"/>
-            <a:ext cx="8064872" cy="5078313"/>
+            <a:off x="1619672" y="1748320"/>
+            <a:ext cx="5756910" cy="5042535"/>
           </a:xfrm>
           <a:prstGeom prst="rect">
             <a:avLst/>
           </a:prstGeom>
-          <a:noFill/>
         </p:spPr>
-        <p:txBody>
-          <a:bodyPr wrap="square" rtlCol="0">
-            <a:spAutoFit/>
-          </a:bodyPr>
-          <a:lstStyle/>
-          <a:p>
-            <a:pPr marL="342900" indent="-342900" algn="just">
-              <a:buBlip>
-                <a:blip r:embed="rId3"/>
-              </a:buBlip>
-            </a:pPr>
-            <a:r>
-              <a:rPr lang="en-US" dirty="0" err="1"/>
-              <a:t>Performanță</a:t>
-            </a:r>
-            <a:r>
-              <a:rPr lang="en-US" dirty="0"/>
-              <a:t> </a:t>
-            </a:r>
-            <a:r>
-              <a:rPr lang="en-US" dirty="0" err="1"/>
-              <a:t>superioară</a:t>
-            </a:r>
-            <a:r>
-              <a:rPr lang="en-US" dirty="0"/>
-              <a:t>: </a:t>
-            </a:r>
-            <a:r>
-              <a:rPr lang="en-US" dirty="0" err="1"/>
-              <a:t>Spre</a:t>
-            </a:r>
-            <a:r>
-              <a:rPr lang="en-US" dirty="0"/>
-              <a:t> </a:t>
-            </a:r>
-            <a:r>
-              <a:rPr lang="en-US" dirty="0" err="1"/>
-              <a:t>deosebire</a:t>
-            </a:r>
-            <a:r>
-              <a:rPr lang="en-US" dirty="0"/>
-              <a:t> de </a:t>
-            </a:r>
-            <a:r>
-              <a:rPr lang="en-US" dirty="0" err="1"/>
-              <a:t>alte</a:t>
-            </a:r>
-            <a:r>
-              <a:rPr lang="en-US" dirty="0"/>
-              <a:t> </a:t>
-            </a:r>
-            <a:r>
-              <a:rPr lang="en-US" dirty="0" err="1"/>
-              <a:t>aplicații</a:t>
-            </a:r>
-            <a:r>
-              <a:rPr lang="en-US" dirty="0"/>
-              <a:t> care </a:t>
-            </a:r>
-            <a:r>
-              <a:rPr lang="en-US" dirty="0" err="1"/>
-              <a:t>generează</a:t>
-            </a:r>
-            <a:r>
-              <a:rPr lang="en-US" dirty="0"/>
-              <a:t> </a:t>
-            </a:r>
-            <a:r>
-              <a:rPr lang="en-US" dirty="0" err="1"/>
-              <a:t>documente</a:t>
-            </a:r>
-            <a:r>
-              <a:rPr lang="en-US" dirty="0"/>
-              <a:t> </a:t>
-            </a:r>
-            <a:r>
-              <a:rPr lang="en-US" dirty="0" err="1"/>
-              <a:t>în</a:t>
-            </a:r>
-            <a:r>
-              <a:rPr lang="en-US" dirty="0"/>
-              <a:t> HTML </a:t>
-            </a:r>
-            <a:r>
-              <a:rPr lang="en-US" dirty="0" err="1"/>
-              <a:t>și</a:t>
-            </a:r>
-            <a:r>
-              <a:rPr lang="en-US" dirty="0"/>
-              <a:t> </a:t>
-            </a:r>
-            <a:r>
-              <a:rPr lang="en-US" dirty="0" err="1"/>
-              <a:t>apoi</a:t>
-            </a:r>
-            <a:r>
-              <a:rPr lang="en-US" dirty="0"/>
-              <a:t> le </a:t>
-            </a:r>
-            <a:r>
-              <a:rPr lang="en-US" dirty="0" err="1"/>
-              <a:t>convertesc</a:t>
-            </a:r>
-            <a:r>
-              <a:rPr lang="en-US" dirty="0"/>
-              <a:t> </a:t>
-            </a:r>
-            <a:r>
-              <a:rPr lang="en-US" dirty="0" err="1"/>
-              <a:t>în</a:t>
-            </a:r>
-            <a:r>
-              <a:rPr lang="en-US" dirty="0"/>
-              <a:t> PDF, </a:t>
-            </a:r>
-            <a:r>
-              <a:rPr lang="en-US" dirty="0" err="1"/>
-              <a:t>InvoiceJet</a:t>
-            </a:r>
-            <a:r>
-              <a:rPr lang="en-US" dirty="0"/>
-              <a:t> </a:t>
-            </a:r>
-            <a:r>
-              <a:rPr lang="en-US" dirty="0" err="1"/>
-              <a:t>convertește</a:t>
-            </a:r>
-            <a:r>
-              <a:rPr lang="en-US" dirty="0"/>
-              <a:t> direct </a:t>
-            </a:r>
-            <a:r>
-              <a:rPr lang="en-US" dirty="0" err="1"/>
-              <a:t>în</a:t>
-            </a:r>
-            <a:r>
-              <a:rPr lang="en-US" dirty="0"/>
-              <a:t> PDF </a:t>
-            </a:r>
-            <a:r>
-              <a:rPr lang="en-US" dirty="0" err="1"/>
-              <a:t>și</a:t>
-            </a:r>
-            <a:r>
-              <a:rPr lang="en-US" dirty="0"/>
-              <a:t> face embed cu </a:t>
-            </a:r>
-            <a:r>
-              <a:rPr lang="en-US" dirty="0" err="1"/>
-              <a:t>iframe</a:t>
-            </a:r>
-            <a:r>
-              <a:rPr lang="en-US" dirty="0"/>
-              <a:t>, </a:t>
-            </a:r>
-            <a:r>
-              <a:rPr lang="en-US" dirty="0" err="1"/>
-              <a:t>oferind</a:t>
-            </a:r>
-            <a:r>
-              <a:rPr lang="en-US" dirty="0"/>
-              <a:t> </a:t>
-            </a:r>
-            <a:r>
-              <a:rPr lang="en-US" dirty="0" err="1"/>
-              <a:t>oferind</a:t>
-            </a:r>
-            <a:r>
-              <a:rPr lang="en-US" dirty="0"/>
-              <a:t> o </a:t>
-            </a:r>
-            <a:r>
-              <a:rPr lang="en-US" dirty="0" err="1"/>
-              <a:t>performanță</a:t>
-            </a:r>
-            <a:r>
-              <a:rPr lang="en-US" dirty="0"/>
-              <a:t> </a:t>
-            </a:r>
-            <a:r>
-              <a:rPr lang="en-US" dirty="0" err="1"/>
-              <a:t>mai</a:t>
-            </a:r>
-            <a:r>
-              <a:rPr lang="en-US" dirty="0"/>
-              <a:t> </a:t>
-            </a:r>
-            <a:r>
-              <a:rPr lang="en-US" dirty="0" err="1"/>
-              <a:t>bună</a:t>
-            </a:r>
-            <a:r>
-              <a:rPr lang="ro-RO" dirty="0"/>
-              <a:t> și un timp de previzualizare mai rapid.</a:t>
-            </a:r>
-          </a:p>
-          <a:p>
-            <a:pPr algn="just"/>
-            <a:endParaRPr lang="ro-RO" dirty="0"/>
-          </a:p>
-          <a:p>
-            <a:pPr marL="342900" indent="-342900" algn="just">
-              <a:buBlip>
-                <a:blip r:embed="rId3"/>
-              </a:buBlip>
-            </a:pPr>
-            <a:r>
-              <a:rPr lang="en-US" dirty="0" err="1">
-                <a:latin typeface="UT Sans"/>
-              </a:rPr>
-              <a:t>Editare</a:t>
-            </a:r>
-            <a:r>
-              <a:rPr lang="ro-RO" dirty="0">
-                <a:latin typeface="UT Sans"/>
-              </a:rPr>
-              <a:t>/previzualizare</a:t>
-            </a:r>
-            <a:r>
-              <a:rPr lang="en-US" dirty="0">
-                <a:latin typeface="UT Sans"/>
-              </a:rPr>
-              <a:t> </a:t>
-            </a:r>
-            <a:r>
-              <a:rPr lang="en-US" dirty="0" err="1">
-                <a:latin typeface="UT Sans"/>
-              </a:rPr>
-              <a:t>facturi</a:t>
-            </a:r>
-            <a:r>
-              <a:rPr lang="en-US" dirty="0">
-                <a:latin typeface="UT Sans"/>
-              </a:rPr>
-              <a:t> </a:t>
-            </a:r>
-            <a:r>
-              <a:rPr lang="en-US" dirty="0" err="1">
-                <a:latin typeface="UT Sans"/>
-              </a:rPr>
-              <a:t>emise</a:t>
-            </a:r>
-            <a:r>
-              <a:rPr lang="en-US" dirty="0">
-                <a:latin typeface="UT Sans"/>
-              </a:rPr>
-              <a:t>: </a:t>
-            </a:r>
-            <a:r>
-              <a:rPr lang="en-US" dirty="0" err="1">
-                <a:latin typeface="UT Sans"/>
-              </a:rPr>
-              <a:t>Oferă</a:t>
-            </a:r>
-            <a:r>
-              <a:rPr lang="en-US" dirty="0">
-                <a:latin typeface="UT Sans"/>
-              </a:rPr>
-              <a:t> </a:t>
-            </a:r>
-            <a:r>
-              <a:rPr lang="en-US" dirty="0" err="1">
-                <a:latin typeface="UT Sans"/>
-              </a:rPr>
-              <a:t>posibilitatea</a:t>
-            </a:r>
-            <a:r>
-              <a:rPr lang="en-US" dirty="0">
-                <a:latin typeface="UT Sans"/>
-              </a:rPr>
-              <a:t> de a </a:t>
-            </a:r>
-            <a:r>
-              <a:rPr lang="en-US" dirty="0" err="1">
-                <a:latin typeface="UT Sans"/>
-              </a:rPr>
-              <a:t>edita</a:t>
-            </a:r>
-            <a:r>
-              <a:rPr lang="en-US" dirty="0">
-                <a:latin typeface="UT Sans"/>
-              </a:rPr>
-              <a:t> </a:t>
-            </a:r>
-            <a:r>
-              <a:rPr lang="en-US" dirty="0" err="1">
-                <a:latin typeface="UT Sans"/>
-              </a:rPr>
-              <a:t>facturile</a:t>
-            </a:r>
-            <a:r>
-              <a:rPr lang="en-US" dirty="0">
-                <a:latin typeface="UT Sans"/>
-              </a:rPr>
-              <a:t> </a:t>
-            </a:r>
-            <a:r>
-              <a:rPr lang="en-US" dirty="0" err="1">
-                <a:latin typeface="UT Sans"/>
-              </a:rPr>
-              <a:t>chiar</a:t>
-            </a:r>
-            <a:r>
-              <a:rPr lang="en-US" dirty="0">
-                <a:latin typeface="UT Sans"/>
-              </a:rPr>
-              <a:t> </a:t>
-            </a:r>
-            <a:r>
-              <a:rPr lang="en-US" dirty="0" err="1">
-                <a:latin typeface="UT Sans"/>
-              </a:rPr>
-              <a:t>și</a:t>
-            </a:r>
-            <a:r>
-              <a:rPr lang="en-US" dirty="0">
-                <a:latin typeface="UT Sans"/>
-              </a:rPr>
-              <a:t> </a:t>
-            </a:r>
-            <a:r>
-              <a:rPr lang="en-US" dirty="0" err="1">
-                <a:latin typeface="UT Sans"/>
-              </a:rPr>
-              <a:t>după</a:t>
-            </a:r>
-            <a:r>
-              <a:rPr lang="en-US" dirty="0">
-                <a:latin typeface="UT Sans"/>
-              </a:rPr>
-              <a:t> </a:t>
-            </a:r>
-            <a:r>
-              <a:rPr lang="en-US" dirty="0" err="1">
-                <a:latin typeface="UT Sans"/>
-              </a:rPr>
-              <a:t>ce</a:t>
-            </a:r>
-            <a:r>
-              <a:rPr lang="en-US" dirty="0">
-                <a:latin typeface="UT Sans"/>
-              </a:rPr>
-              <a:t> au </a:t>
-            </a:r>
-            <a:r>
-              <a:rPr lang="en-US" dirty="0" err="1">
-                <a:latin typeface="UT Sans"/>
-              </a:rPr>
-              <a:t>fost</a:t>
-            </a:r>
-            <a:r>
-              <a:rPr lang="en-US" dirty="0">
-                <a:latin typeface="UT Sans"/>
-              </a:rPr>
-              <a:t> </a:t>
-            </a:r>
-            <a:r>
-              <a:rPr lang="en-US" dirty="0" err="1">
-                <a:latin typeface="UT Sans"/>
-              </a:rPr>
-              <a:t>emise</a:t>
-            </a:r>
-            <a:r>
-              <a:rPr lang="en-US" dirty="0">
-                <a:latin typeface="UT Sans"/>
-              </a:rPr>
-              <a:t>.</a:t>
-            </a:r>
-            <a:r>
-              <a:rPr lang="ro-RO" dirty="0">
-                <a:latin typeface="UT Sans"/>
-              </a:rPr>
-              <a:t> Oferă posibilitatea de previzualizare a facturii, înainte ca aceasta să fie actualizată.</a:t>
-            </a:r>
-          </a:p>
-          <a:p>
-            <a:pPr algn="just"/>
-            <a:endParaRPr lang="ro-RO" dirty="0">
-              <a:latin typeface="UT Sans"/>
-            </a:endParaRPr>
-          </a:p>
-          <a:p>
-            <a:pPr marL="342900" indent="-342900" algn="just">
-              <a:buBlip>
-                <a:blip r:embed="rId3"/>
-              </a:buBlip>
-            </a:pPr>
-            <a:r>
-              <a:rPr lang="en-US" dirty="0" err="1"/>
-              <a:t>Aplicație</a:t>
-            </a:r>
-            <a:r>
-              <a:rPr lang="en-US" dirty="0"/>
-              <a:t> Single Page (SPA): </a:t>
-            </a:r>
-            <a:r>
-              <a:rPr lang="en-US" dirty="0" err="1"/>
-              <a:t>InvoiceJet</a:t>
-            </a:r>
-            <a:r>
-              <a:rPr lang="en-US" dirty="0"/>
-              <a:t> </a:t>
-            </a:r>
-            <a:r>
-              <a:rPr lang="en-US" dirty="0" err="1"/>
-              <a:t>este</a:t>
-            </a:r>
-            <a:r>
-              <a:rPr lang="en-US" dirty="0"/>
-              <a:t> o </a:t>
-            </a:r>
-            <a:r>
-              <a:rPr lang="en-US" dirty="0" err="1"/>
-              <a:t>aplicație</a:t>
-            </a:r>
-            <a:r>
-              <a:rPr lang="en-US" dirty="0"/>
-              <a:t> de tip SPA, </a:t>
-            </a:r>
-            <a:r>
-              <a:rPr lang="en-US" dirty="0" err="1"/>
-              <a:t>spre</a:t>
-            </a:r>
-            <a:r>
-              <a:rPr lang="en-US" dirty="0"/>
-              <a:t> </a:t>
-            </a:r>
-            <a:r>
-              <a:rPr lang="en-US" dirty="0" err="1"/>
-              <a:t>deosebire</a:t>
-            </a:r>
-            <a:r>
-              <a:rPr lang="en-US" dirty="0"/>
-              <a:t> de </a:t>
-            </a:r>
-            <a:r>
-              <a:rPr lang="en-US" dirty="0" err="1"/>
-              <a:t>multe</a:t>
-            </a:r>
-            <a:r>
-              <a:rPr lang="en-US" dirty="0"/>
-              <a:t> </a:t>
-            </a:r>
-            <a:r>
-              <a:rPr lang="en-US" dirty="0" err="1"/>
-              <a:t>alte</a:t>
-            </a:r>
-            <a:r>
-              <a:rPr lang="en-US" dirty="0"/>
-              <a:t> </a:t>
-            </a:r>
-            <a:r>
-              <a:rPr lang="en-US" dirty="0" err="1"/>
-              <a:t>aplicații</a:t>
-            </a:r>
-            <a:r>
-              <a:rPr lang="en-US" dirty="0"/>
-              <a:t> de pe </a:t>
-            </a:r>
-            <a:r>
-              <a:rPr lang="en-US" dirty="0" err="1"/>
-              <a:t>piață</a:t>
-            </a:r>
-            <a:r>
-              <a:rPr lang="en-US" dirty="0"/>
-              <a:t>, </a:t>
-            </a:r>
-            <a:r>
-              <a:rPr lang="en-US" dirty="0" err="1"/>
-              <a:t>asigurând</a:t>
-            </a:r>
-            <a:r>
-              <a:rPr lang="en-US" dirty="0"/>
-              <a:t> o </a:t>
-            </a:r>
-            <a:r>
-              <a:rPr lang="en-US" dirty="0" err="1"/>
-              <a:t>experiență</a:t>
-            </a:r>
-            <a:r>
-              <a:rPr lang="en-US" dirty="0"/>
-              <a:t> de </a:t>
-            </a:r>
-            <a:r>
-              <a:rPr lang="en-US" dirty="0" err="1"/>
-              <a:t>utilizare</a:t>
-            </a:r>
-            <a:r>
-              <a:rPr lang="en-US" dirty="0"/>
-              <a:t> </a:t>
-            </a:r>
-            <a:r>
-              <a:rPr lang="en-US" dirty="0" err="1"/>
-              <a:t>fluidă</a:t>
-            </a:r>
-            <a:r>
-              <a:rPr lang="en-US" dirty="0"/>
-              <a:t> </a:t>
-            </a:r>
-            <a:r>
-              <a:rPr lang="en-US" dirty="0" err="1"/>
-              <a:t>și</a:t>
-            </a:r>
-            <a:r>
-              <a:rPr lang="en-US" dirty="0"/>
-              <a:t> </a:t>
-            </a:r>
-            <a:r>
-              <a:rPr lang="en-US" dirty="0" err="1"/>
-              <a:t>rapidă</a:t>
-            </a:r>
-            <a:r>
-              <a:rPr lang="ro-RO" dirty="0"/>
-              <a:t>, fără reîncarcare paginii la schimbarea rutei.</a:t>
-            </a:r>
-          </a:p>
-          <a:p>
-            <a:pPr algn="just"/>
-            <a:endParaRPr lang="ro-RO" dirty="0">
-              <a:latin typeface="UT Sans"/>
-            </a:endParaRPr>
-          </a:p>
-          <a:p>
-            <a:pPr marL="342900" indent="-342900" algn="just">
-              <a:buBlip>
-                <a:blip r:embed="rId3"/>
-              </a:buBlip>
-            </a:pPr>
-            <a:r>
-              <a:rPr lang="ro-RO" dirty="0">
-                <a:latin typeface="UT Sans"/>
-              </a:rPr>
-              <a:t>Acuratețea datelor financiare</a:t>
-            </a:r>
-            <a:r>
-              <a:rPr lang="en-US" dirty="0">
-                <a:latin typeface="UT Sans"/>
-              </a:rPr>
-              <a:t>: </a:t>
-            </a:r>
-            <a:r>
-              <a:rPr lang="ro-RO" dirty="0">
-                <a:latin typeface="UT Sans"/>
-              </a:rPr>
-              <a:t>Datele formelor juridice pot fi populate cu ajutorul API-ului oferit de ANAF, care conține date specifice necesare pentru completarea datelor furnizorilor, cât și a clienților specificând doar câmpul CUI.</a:t>
-            </a:r>
-            <a:r>
-              <a:rPr lang="en-US" dirty="0">
-                <a:latin typeface="UT Sans"/>
-              </a:rPr>
-              <a:t>	</a:t>
-            </a:r>
-            <a:endParaRPr lang="ro-RO" dirty="0">
-              <a:latin typeface="UT Sans"/>
-            </a:endParaRPr>
-          </a:p>
-          <a:p>
-            <a:pPr algn="just"/>
-            <a:r>
-              <a:rPr lang="ro-RO" dirty="0">
-                <a:latin typeface="UT Sans"/>
-              </a:rPr>
-              <a:t>	</a:t>
-            </a:r>
-            <a:endParaRPr lang="en-US" dirty="0">
-              <a:latin typeface="UT Sans"/>
-            </a:endParaRPr>
-          </a:p>
-          <a:p>
-            <a:pPr algn="just"/>
-            <a:r>
-              <a:rPr lang="en-US" dirty="0">
-                <a:latin typeface="UT Sans"/>
-              </a:rPr>
-              <a:t>       </a:t>
-            </a:r>
-            <a:endParaRPr lang="ro-RO" dirty="0">
-              <a:latin typeface="UT Sans"/>
-            </a:endParaRPr>
-          </a:p>
-        </p:txBody>
-      </p:sp>
+      </p:pic>
     </p:spTree>
     <p:extLst>
       <p:ext uri="{BB962C8B-B14F-4D97-AF65-F5344CB8AC3E}">
-        <p14:creationId xmlns:p14="http://schemas.microsoft.com/office/powerpoint/2010/main" val="79503179"/>
+        <p14:creationId xmlns:p14="http://schemas.microsoft.com/office/powerpoint/2010/main" val="3051468121"/>
       </p:ext>
     </p:extLst>
   </p:cSld>

</xml_diff>